<commit_message>
week1 is the final presentation, week3 still a draft
</commit_message>
<xml_diff>
--- a/Beyond Scratch Basics week1.pptx
+++ b/Beyond Scratch Basics week1.pptx
@@ -123,7 +123,7 @@
   </p:defaultTextStyle>
   <p:extLst>
     <p:ext uri="{EFAFB233-063F-42B5-8137-9DF3F51BA10A}">
-      <p15:sldGuideLst xmlns:p15="http://schemas.microsoft.com/office/powerpoint/2012/main">
+      <p15:sldGuideLst xmlns:p15="http://schemas.microsoft.com/office/powerpoint/2012/main" xmlns="">
         <p15:guide id="1" orient="horz" pos="2160">
           <p15:clr>
             <a:srgbClr val="A4A3A4"/>
@@ -222,7 +222,7 @@
           <a:p>
             <a:fld id="{9BFDE811-7E5B-43DD-9EE2-2C600B30D8F1}" type="datetimeFigureOut">
               <a:rPr lang="en-US" smtClean="0"/>
-              <a:t>2/9/2014</a:t>
+              <a:t>2/11/2014</a:t>
             </a:fld>
             <a:endParaRPr lang="en-US"/>
           </a:p>
@@ -705,7 +705,7 @@
           <a:p>
             <a:fld id="{F52004B7-4623-456F-BE48-522AFC8CF2B3}" type="datetime1">
               <a:rPr lang="en-US" smtClean="0"/>
-              <a:t>2/9/2014</a:t>
+              <a:t>2/11/2014</a:t>
             </a:fld>
             <a:endParaRPr lang="en-US"/>
           </a:p>
@@ -898,7 +898,7 @@
           <a:p>
             <a:fld id="{C9BEEE3F-2BBC-48F5-8F25-640303459AB2}" type="datetime1">
               <a:rPr lang="en-US" smtClean="0"/>
-              <a:t>2/9/2014</a:t>
+              <a:t>2/11/2014</a:t>
             </a:fld>
             <a:endParaRPr lang="en-US"/>
           </a:p>
@@ -1101,7 +1101,7 @@
           <a:p>
             <a:fld id="{A6C697E3-6ABA-4441-A8E4-6576C9BA644D}" type="datetime1">
               <a:rPr lang="en-US" smtClean="0"/>
-              <a:t>2/9/2014</a:t>
+              <a:t>2/11/2014</a:t>
             </a:fld>
             <a:endParaRPr lang="en-US"/>
           </a:p>
@@ -1294,7 +1294,7 @@
           <a:p>
             <a:fld id="{2109C9D0-AF2F-452F-8FB0-AFC0FA233BC8}" type="datetime1">
               <a:rPr lang="en-US" smtClean="0"/>
-              <a:t>2/9/2014</a:t>
+              <a:t>2/11/2014</a:t>
             </a:fld>
             <a:endParaRPr lang="en-US"/>
           </a:p>
@@ -1563,7 +1563,7 @@
           <a:p>
             <a:fld id="{9DFD1AA4-3C72-480C-9771-3F07EE32C260}" type="datetime1">
               <a:rPr lang="en-US" smtClean="0"/>
-              <a:t>2/9/2014</a:t>
+              <a:t>2/11/2014</a:t>
             </a:fld>
             <a:endParaRPr lang="en-US"/>
           </a:p>
@@ -1818,7 +1818,7 @@
           <a:p>
             <a:fld id="{9CA27C91-8AE0-4714-ACB7-3BF8DB5DF192}" type="datetime1">
               <a:rPr lang="en-US" smtClean="0"/>
-              <a:t>2/9/2014</a:t>
+              <a:t>2/11/2014</a:t>
             </a:fld>
             <a:endParaRPr lang="en-US"/>
           </a:p>
@@ -2208,7 +2208,7 @@
           <a:p>
             <a:fld id="{A2E6425C-0710-416E-A44E-63D2F43774F0}" type="datetime1">
               <a:rPr lang="en-US" smtClean="0"/>
-              <a:t>2/9/2014</a:t>
+              <a:t>2/11/2014</a:t>
             </a:fld>
             <a:endParaRPr lang="en-US"/>
           </a:p>
@@ -2349,7 +2349,7 @@
           <a:p>
             <a:fld id="{6D3FA7E6-306C-4C29-8040-77E043270496}" type="datetime1">
               <a:rPr lang="en-US" smtClean="0"/>
-              <a:t>2/9/2014</a:t>
+              <a:t>2/11/2014</a:t>
             </a:fld>
             <a:endParaRPr lang="en-US"/>
           </a:p>
@@ -2467,7 +2467,7 @@
           <a:p>
             <a:fld id="{C4BECA58-A5BA-4EB1-B604-033CDA7E77C2}" type="datetime1">
               <a:rPr lang="en-US" smtClean="0"/>
-              <a:t>2/9/2014</a:t>
+              <a:t>2/11/2014</a:t>
             </a:fld>
             <a:endParaRPr lang="en-US"/>
           </a:p>
@@ -2767,7 +2767,7 @@
           <a:p>
             <a:fld id="{B75A2790-60B4-4C42-B7B5-7F6A20AC0DE8}" type="datetime1">
               <a:rPr lang="en-US" smtClean="0"/>
-              <a:t>2/9/2014</a:t>
+              <a:t>2/11/2014</a:t>
             </a:fld>
             <a:endParaRPr lang="en-US"/>
           </a:p>
@@ -3043,7 +3043,7 @@
           <a:p>
             <a:fld id="{2B8407F5-33AC-4100-9340-A931588801B1}" type="datetime1">
               <a:rPr lang="en-US" smtClean="0"/>
-              <a:t>2/9/2014</a:t>
+              <a:t>2/11/2014</a:t>
             </a:fld>
             <a:endParaRPr lang="en-US"/>
           </a:p>
@@ -3296,7 +3296,7 @@
           <a:p>
             <a:fld id="{77E0C663-1FA7-4BF7-A097-B97F5C8459BE}" type="datetime1">
               <a:rPr lang="en-US" smtClean="0"/>
-              <a:t>2/9/2014</a:t>
+              <a:t>2/11/2014</a:t>
             </a:fld>
             <a:endParaRPr lang="en-US"/>
           </a:p>
@@ -4254,8 +4254,13 @@
             </a:pPr>
             <a:r>
               <a:rPr lang="en-US" dirty="0" smtClean="0"/>
-              <a:t>Next step: Introducing “Asteroids”</a:t>
-            </a:r>
+              <a:t>Next step: Introducing </a:t>
+            </a:r>
+            <a:r>
+              <a:rPr lang="en-US" dirty="0" smtClean="0"/>
+              <a:t>Cloning</a:t>
+            </a:r>
+            <a:endParaRPr lang="en-US" dirty="0" smtClean="0"/>
           </a:p>
           <a:p>
             <a:pPr marL="285750" indent="-285750">
@@ -4341,11 +4346,7 @@
           <a:p>
             <a:r>
               <a:rPr lang="en-US" sz="3600" b="1" dirty="0" smtClean="0"/>
-              <a:t>Add a simple Message to Heart </a:t>
-            </a:r>
-            <a:r>
-              <a:rPr lang="en-US" sz="3600" b="1" dirty="0" smtClean="0"/>
-              <a:t>Bounce</a:t>
+              <a:t>Add a simple Message to Heart Bounce</a:t>
             </a:r>
             <a:endParaRPr lang="en-US" sz="3600" b="1" dirty="0"/>
           </a:p>
@@ -4393,23 +4394,7 @@
                   <a:srgbClr val="0070C0"/>
                 </a:solidFill>
               </a:rPr>
-              <a:t>What if I </a:t>
-            </a:r>
-            <a:r>
-              <a:rPr lang="en-US" dirty="0" smtClean="0">
-                <a:solidFill>
-                  <a:srgbClr val="0070C0"/>
-                </a:solidFill>
-              </a:rPr>
-              <a:t>suggested </a:t>
-            </a:r>
-            <a:r>
-              <a:rPr lang="en-US" dirty="0" smtClean="0">
-                <a:solidFill>
-                  <a:srgbClr val="0070C0"/>
-                </a:solidFill>
-              </a:rPr>
-              <a:t>there’s a </a:t>
+              <a:t>What if I suggested there’s a </a:t>
             </a:r>
           </a:p>
           <a:p>
@@ -5200,11 +5185,7 @@
             </a:pPr>
             <a:r>
               <a:rPr lang="en-US" dirty="0" smtClean="0"/>
-              <a:t>     On </a:t>
-            </a:r>
-            <a:r>
-              <a:rPr lang="en-US" dirty="0" smtClean="0"/>
-              <a:t>the paddle:</a:t>
+              <a:t>     On the paddle:</a:t>
             </a:r>
           </a:p>
           <a:p>
@@ -6095,19 +6076,7 @@
           <a:p>
             <a:r>
               <a:rPr lang="en-US" dirty="0" smtClean="0"/>
-              <a:t>If you have information that </a:t>
-            </a:r>
-            <a:r>
-              <a:rPr lang="en-US" dirty="0" smtClean="0"/>
-              <a:t>changes, use</a:t>
-            </a:r>
-            <a:r>
-              <a:rPr lang="en-US" dirty="0" smtClean="0"/>
-              <a:t> </a:t>
-            </a:r>
-            <a:r>
-              <a:rPr lang="en-US" dirty="0" smtClean="0"/>
-              <a:t>“variables”</a:t>
+              <a:t>If you have information that changes, use “variables”</a:t>
             </a:r>
           </a:p>
           <a:p>
@@ -6117,23 +6086,7 @@
                   <a:srgbClr val="00B0F0"/>
                 </a:solidFill>
               </a:rPr>
-              <a:t>What data might you want in </a:t>
-            </a:r>
-            <a:r>
-              <a:rPr lang="en-US" dirty="0" smtClean="0">
-                <a:solidFill>
-                  <a:srgbClr val="00B0F0"/>
-                </a:solidFill>
-              </a:rPr>
-              <a:t>Pong </a:t>
-            </a:r>
-            <a:r>
-              <a:rPr lang="en-US" dirty="0" smtClean="0">
-                <a:solidFill>
-                  <a:srgbClr val="00B0F0"/>
-                </a:solidFill>
-              </a:rPr>
-              <a:t>or Bat Away or Heart Bounce?</a:t>
+              <a:t>What data might you want in Pong or Bat Away or Heart Bounce?</a:t>
             </a:r>
           </a:p>
           <a:p>
@@ -6143,23 +6096,7 @@
                   <a:srgbClr val="7030A0"/>
                 </a:solidFill>
               </a:rPr>
-              <a:t>Smallest </a:t>
-            </a:r>
-            <a:r>
-              <a:rPr lang="en-US" dirty="0" smtClean="0">
-                <a:solidFill>
-                  <a:srgbClr val="7030A0"/>
-                </a:solidFill>
-              </a:rPr>
-              <a:t>change:  Add the score (a ‘bounce’ count</a:t>
-            </a:r>
-            <a:r>
-              <a:rPr lang="en-US" dirty="0" smtClean="0">
-                <a:solidFill>
-                  <a:srgbClr val="7030A0"/>
-                </a:solidFill>
-              </a:rPr>
-              <a:t>)</a:t>
+              <a:t>Smallest change:  Add the score (a ‘bounce’ count)</a:t>
             </a:r>
           </a:p>
           <a:p>
@@ -6171,11 +6108,6 @@
               </a:rPr>
               <a:t>Use the checkbox to have it automatically display </a:t>
             </a:r>
-            <a:endParaRPr lang="en-US" dirty="0" smtClean="0">
-              <a:solidFill>
-                <a:srgbClr val="7030A0"/>
-              </a:solidFill>
-            </a:endParaRPr>
           </a:p>
           <a:p>
             <a:r>
@@ -6357,7 +6289,6 @@
               <a:rPr lang="en-US" dirty="0" smtClean="0"/>
               <a:t>.  </a:t>
             </a:r>
-            <a:endParaRPr lang="en-US" dirty="0" smtClean="0"/>
           </a:p>
           <a:p>
             <a:pPr marL="0" indent="0">
@@ -6365,17 +6296,8 @@
             </a:pPr>
             <a:r>
               <a:rPr lang="en-US" dirty="0" smtClean="0"/>
-              <a:t>What </a:t>
-            </a:r>
-            <a:r>
-              <a:rPr lang="en-US" dirty="0" smtClean="0"/>
-              <a:t>topics did we cover </a:t>
-            </a:r>
-            <a:r>
-              <a:rPr lang="en-US" dirty="0" smtClean="0"/>
-              <a:t>which would help?</a:t>
-            </a:r>
-            <a:endParaRPr lang="en-US" dirty="0" smtClean="0"/>
+              <a:t>What topics did we cover which would help?</a:t>
+            </a:r>
           </a:p>
           <a:p>
             <a:pPr marL="0" indent="0">
@@ -6499,11 +6421,7 @@
             </a:r>
             <a:r>
               <a:rPr lang="en-US" dirty="0" smtClean="0"/>
-              <a:t>the</a:t>
-            </a:r>
-            <a:r>
-              <a:rPr lang="en-US" dirty="0" smtClean="0"/>
-              <a:t> </a:t>
+              <a:t>the </a:t>
             </a:r>
             <a:r>
               <a:rPr lang="en-US" dirty="0"/>
@@ -6521,14 +6439,12 @@
               <a:rPr lang="en-US" dirty="0" smtClean="0"/>
               <a:t>sprite (“Game Over, play again?”) </a:t>
             </a:r>
-            <a:endParaRPr lang="en-US" dirty="0" smtClean="0"/>
           </a:p>
           <a:p>
             <a:r>
               <a:rPr lang="en-US" dirty="0" smtClean="0"/>
               <a:t>I think I need a new “Heart Missed” message</a:t>
             </a:r>
-            <a:endParaRPr lang="en-US" dirty="0" smtClean="0"/>
           </a:p>
           <a:p>
             <a:r>
@@ -6543,24 +6459,11 @@
               <a:rPr lang="en-US" dirty="0" smtClean="0"/>
               <a:t> display “You missed.  Here’s another heart”  </a:t>
             </a:r>
-            <a:endParaRPr lang="en-US" dirty="0" smtClean="0"/>
           </a:p>
           <a:p>
             <a:r>
               <a:rPr lang="en-US" dirty="0" smtClean="0"/>
-              <a:t>I would put </a:t>
-            </a:r>
-            <a:r>
-              <a:rPr lang="en-US" dirty="0" smtClean="0"/>
-              <a:t>message handlers </a:t>
-            </a:r>
-            <a:r>
-              <a:rPr lang="en-US" dirty="0" smtClean="0"/>
-              <a:t>on that sprite to set the correct costume to match the </a:t>
-            </a:r>
-            <a:r>
-              <a:rPr lang="en-US" dirty="0" smtClean="0"/>
-              <a:t>messages.</a:t>
+              <a:t>I would put message handlers on that sprite to set the correct costume to match the messages.</a:t>
             </a:r>
             <a:endParaRPr lang="en-US" dirty="0"/>
           </a:p>
@@ -6587,11 +6490,7 @@
             </a:r>
             <a:r>
               <a:rPr lang="en-US" i="1" dirty="0" smtClean="0"/>
-              <a:t>‘</a:t>
-            </a:r>
-            <a:r>
-              <a:rPr lang="en-US" i="1" dirty="0" smtClean="0"/>
-              <a:t>Start </a:t>
+              <a:t>‘Start </a:t>
             </a:r>
             <a:r>
               <a:rPr lang="en-US" i="1" dirty="0"/>
@@ -6981,18 +6880,25 @@
   <p:clrMapOvr>
     <a:masterClrMapping/>
   </p:clrMapOvr>
-  <mc:AlternateContent xmlns:mc="http://schemas.openxmlformats.org/markup-compatibility/2006">
-    <mc:Choice xmlns:p14="http://schemas.microsoft.com/office/powerpoint/2010/main" Requires="p14">
+  <mc:AlternateContent xmlns:mc="http://schemas.openxmlformats.org/markup-compatibility/2006" xmlns:p14="http://schemas.microsoft.com/office/powerpoint/2010/main">
+    <mc:Choice Requires="p14">
       <p:transition spd="slow" p14:dur="2000">
         <p14:honeycomb/>
       </p:transition>
     </mc:Choice>
-    <mc:Fallback>
+    <mc:Fallback xmlns="">
       <p:transition spd="slow">
         <p:fade/>
       </p:transition>
     </mc:Fallback>
   </mc:AlternateContent>
+  <p:timing>
+    <p:tnLst>
+      <p:par>
+        <p:cTn id="1" dur="indefinite" restart="never" nodeType="tmRoot"/>
+      </p:par>
+    </p:tnLst>
+  </p:timing>
 </p:sld>
 </file>
 
@@ -7032,11 +6938,7 @@
           <a:p>
             <a:r>
               <a:rPr lang="en-US" sz="3600" b="1" dirty="0" smtClean="0"/>
-              <a:t>Future topic: </a:t>
-            </a:r>
-            <a:r>
-              <a:rPr lang="en-US" sz="3600" b="1" dirty="0" smtClean="0"/>
-              <a:t>cloning</a:t>
+              <a:t>Future topic: cloning</a:t>
             </a:r>
             <a:endParaRPr lang="en-US" sz="3600" b="1" dirty="0"/>
           </a:p>
@@ -7239,22 +7141,34 @@
         </p:nvSpPr>
         <p:spPr/>
         <p:txBody>
-          <a:bodyPr/>
+          <a:bodyPr>
+            <a:normAutofit/>
+          </a:bodyPr>
           <a:lstStyle/>
           <a:p>
             <a:r>
+              <a:rPr lang="en-US" dirty="0"/>
+              <a:t>FUN! Learn more of the fun things you can do with Scratch</a:t>
+            </a:r>
+            <a:endParaRPr lang="en-US" dirty="0" smtClean="0"/>
+          </a:p>
+          <a:p>
+            <a:endParaRPr lang="en-US" dirty="0"/>
+          </a:p>
+          <a:p>
+            <a:r>
               <a:rPr lang="en-US" dirty="0" smtClean="0"/>
-              <a:t>Learn more of the basics of writing software using Scratch (because Scratch is more fun and easy than just about anything else I’ve seen.)</a:t>
-            </a:r>
-          </a:p>
-          <a:p>
-            <a:endParaRPr lang="en-US" dirty="0"/>
-          </a:p>
-          <a:p>
+              <a:t>Learn </a:t>
+            </a:r>
             <a:r>
               <a:rPr lang="en-US" dirty="0" smtClean="0"/>
-              <a:t>Learn more of the fun things you can do with Scratch</a:t>
-            </a:r>
+              <a:t>more of the basics of writing software using Scratch (because Scratch is more fun and easy than just about anything else I’ve seen</a:t>
+            </a:r>
+            <a:r>
+              <a:rPr lang="en-US" dirty="0" smtClean="0"/>
+              <a:t>.)</a:t>
+            </a:r>
+            <a:endParaRPr lang="en-US" dirty="0" smtClean="0"/>
           </a:p>
           <a:p>
             <a:endParaRPr lang="en-US" dirty="0"/>
@@ -7375,18 +7289,25 @@
   <p:clrMapOvr>
     <a:masterClrMapping/>
   </p:clrMapOvr>
-  <mc:AlternateContent xmlns:mc="http://schemas.openxmlformats.org/markup-compatibility/2006">
-    <mc:Choice xmlns:p14="http://schemas.microsoft.com/office/powerpoint/2010/main" Requires="p14">
+  <mc:AlternateContent xmlns:mc="http://schemas.openxmlformats.org/markup-compatibility/2006" xmlns:p14="http://schemas.microsoft.com/office/powerpoint/2010/main">
+    <mc:Choice Requires="p14">
       <p:transition spd="slow" p14:dur="2000">
         <p14:honeycomb/>
       </p:transition>
     </mc:Choice>
-    <mc:Fallback>
+    <mc:Fallback xmlns="">
       <p:transition spd="slow">
         <p:fade/>
       </p:transition>
     </mc:Fallback>
   </mc:AlternateContent>
+  <p:timing>
+    <p:tnLst>
+      <p:par>
+        <p:cTn id="1" dur="indefinite" restart="never" nodeType="tmRoot"/>
+      </p:par>
+    </p:tnLst>
+  </p:timing>
 </p:sld>
 </file>
 
@@ -8255,17 +8176,7 @@
                   </a:schemeClr>
                 </a:solidFill>
               </a:rPr>
-              <a:t>Tonight’s Project</a:t>
-            </a:r>
-            <a:r>
-              <a:rPr lang="en-US" sz="3900" b="1" dirty="0" smtClean="0">
-                <a:solidFill>
-                  <a:schemeClr val="accent6">
-                    <a:lumMod val="75000"/>
-                  </a:schemeClr>
-                </a:solidFill>
-              </a:rPr>
-              <a:t>: </a:t>
+              <a:t>Tonight’s Project: </a:t>
             </a:r>
             <a:r>
               <a:rPr lang="en-US" sz="3900" b="1" dirty="0" smtClean="0">
@@ -8341,27 +8252,7 @@
             </a:pPr>
             <a:r>
               <a:rPr lang="en-US" dirty="0" smtClean="0"/>
-              <a:t>Earlier </a:t>
-            </a:r>
-            <a:r>
-              <a:rPr lang="en-US" dirty="0" smtClean="0"/>
-              <a:t>project </a:t>
-            </a:r>
-            <a:r>
-              <a:rPr lang="en-US" dirty="0" smtClean="0"/>
-              <a:t>was </a:t>
-            </a:r>
-            <a:r>
-              <a:rPr lang="en-US" dirty="0" smtClean="0"/>
-              <a:t>“Bat Away</a:t>
-            </a:r>
-            <a:r>
-              <a:rPr lang="en-US" dirty="0" smtClean="0"/>
-              <a:t>” or “Pong” </a:t>
-            </a:r>
-            <a:r>
-              <a:rPr lang="en-US" dirty="0" smtClean="0"/>
-              <a:t>and </a:t>
+              <a:t>Earlier project was “Bat Away” or “Pong” and </a:t>
             </a:r>
             <a:r>
               <a:rPr lang="en-US" u="sng" dirty="0" smtClean="0"/>
@@ -8387,11 +8278,7 @@
           <a:p>
             <a:r>
               <a:rPr lang="en-US" dirty="0" smtClean="0"/>
-              <a:t>If the sprite gets </a:t>
-            </a:r>
-            <a:r>
-              <a:rPr lang="en-US" dirty="0" smtClean="0"/>
-              <a:t>past the paddle: </a:t>
+              <a:t>If the sprite gets past the paddle: </a:t>
             </a:r>
             <a:r>
               <a:rPr lang="en-US" dirty="0" smtClean="0">
@@ -8431,15 +8318,7 @@
             </a:pPr>
             <a:r>
               <a:rPr lang="en-US" dirty="0" smtClean="0"/>
-              <a:t>Then: </a:t>
-            </a:r>
-            <a:r>
-              <a:rPr lang="en-US" dirty="0" smtClean="0"/>
-              <a:t>A </a:t>
-            </a:r>
-            <a:r>
-              <a:rPr lang="en-US" dirty="0" smtClean="0"/>
-              <a:t>quick review on script blocks.</a:t>
+              <a:t>Then: A quick review on script blocks.</a:t>
             </a:r>
           </a:p>
           <a:p>
@@ -8454,15 +8333,7 @@
             </a:pPr>
             <a:r>
               <a:rPr lang="en-US" dirty="0" smtClean="0"/>
-              <a:t>First </a:t>
-            </a:r>
-            <a:r>
-              <a:rPr lang="en-US" dirty="0" smtClean="0"/>
-              <a:t>improvement:  Game </a:t>
-            </a:r>
-            <a:r>
-              <a:rPr lang="en-US" dirty="0" smtClean="0"/>
-              <a:t>Start state (“Click to begin”)</a:t>
+              <a:t>First improvement:  Game Start state (“Click to begin”)</a:t>
             </a:r>
           </a:p>
           <a:p>
@@ -8485,11 +8356,7 @@
             </a:r>
             <a:r>
               <a:rPr lang="en-US" dirty="0" smtClean="0"/>
-              <a:t> “</a:t>
-            </a:r>
-            <a:r>
-              <a:rPr lang="en-US" dirty="0" smtClean="0"/>
-              <a:t>Game Over” display </a:t>
+              <a:t> “Game Over” display </a:t>
             </a:r>
             <a:r>
               <a:rPr lang="en-US" sz="2600" b="1" dirty="0" smtClean="0"/>
@@ -8532,7 +8399,6 @@
               <a:rPr lang="en-US" dirty="0" smtClean="0"/>
               <a:t>Final: Show your project!</a:t>
             </a:r>
-            <a:endParaRPr lang="en-US" dirty="0" smtClean="0"/>
           </a:p>
           <a:p>
             <a:pPr marL="0" indent="0">
@@ -9573,35 +9439,19 @@
               <a:rPr lang="en-US" sz="3600" b="1" dirty="0" smtClean="0"/>
               <a:t>! </a:t>
             </a:r>
-            <a:r>
-              <a:rPr lang="en-US" sz="3600" b="1" dirty="0" smtClean="0"/>
-              <a:t/>
-            </a:r>
             <a:br>
               <a:rPr lang="en-US" sz="3600" b="1" dirty="0" smtClean="0"/>
             </a:br>
             <a:r>
               <a:rPr lang="en-US" sz="3600" b="1" dirty="0" smtClean="0"/>
-              <a:t>Change </a:t>
-            </a:r>
-            <a:r>
-              <a:rPr lang="en-US" sz="3600" b="1" dirty="0" smtClean="0"/>
-              <a:t>Bat Away into </a:t>
-            </a:r>
-            <a:r>
-              <a:rPr lang="en-US" sz="3600" b="1" dirty="0" smtClean="0"/>
-              <a:t/>
+              <a:t>Change Bat Away into </a:t>
             </a:r>
             <a:br>
               <a:rPr lang="en-US" sz="3600" b="1" dirty="0" smtClean="0"/>
             </a:br>
             <a:r>
               <a:rPr lang="en-US" sz="3600" b="1" dirty="0" smtClean="0"/>
-              <a:t>Heart </a:t>
-            </a:r>
-            <a:r>
-              <a:rPr lang="en-US" sz="3600" b="1" dirty="0" smtClean="0"/>
-              <a:t>Bounce </a:t>
+              <a:t>Heart Bounce </a:t>
             </a:r>
             <a:endParaRPr lang="en-US" sz="3600" b="1" dirty="0"/>
           </a:p>
@@ -9671,36 +9521,22 @@
               <a:rPr lang="en-US" sz="6300" dirty="0" smtClean="0"/>
               <a:t>/</a:t>
             </a:r>
+          </a:p>
+          <a:p>
             <a:endParaRPr lang="en-US" sz="6300" dirty="0" smtClean="0"/>
           </a:p>
           <a:p>
-            <a:endParaRPr lang="en-US" sz="6300" dirty="0" smtClean="0"/>
-          </a:p>
-          <a:p>
             <a:r>
               <a:rPr lang="en-US" sz="6300" dirty="0" smtClean="0"/>
-              <a:t>Change </a:t>
-            </a:r>
-            <a:r>
-              <a:rPr lang="en-US" sz="6300" dirty="0" smtClean="0"/>
-              <a:t>the background  </a:t>
+              <a:t>Change the background  </a:t>
             </a:r>
           </a:p>
           <a:p>
             <a:pPr lvl="1"/>
             <a:r>
               <a:rPr lang="en-US" sz="6000" dirty="0" smtClean="0"/>
-              <a:t>I </a:t>
-            </a:r>
-            <a:r>
-              <a:rPr lang="en-US" sz="6000" dirty="0" smtClean="0"/>
-              <a:t>chose ‘sparkling</a:t>
-            </a:r>
-            <a:r>
-              <a:rPr lang="en-US" sz="6000" dirty="0" smtClean="0"/>
-              <a:t>’ from the built-in backgrounds</a:t>
-            </a:r>
-            <a:endParaRPr lang="en-US" sz="6000" dirty="0" smtClean="0"/>
+              <a:t>I chose ‘sparkling’ from the built-in backgrounds</a:t>
+            </a:r>
           </a:p>
           <a:p>
             <a:endParaRPr lang="en-US" sz="6300" dirty="0" smtClean="0"/>
@@ -9715,13 +9551,8 @@
             <a:pPr lvl="1"/>
             <a:r>
               <a:rPr lang="en-US" sz="6000" dirty="0" smtClean="0"/>
-              <a:t>In my project, there’s a heart.  Move it to your backpack and then replace the bat</a:t>
-            </a:r>
-            <a:r>
-              <a:rPr lang="en-US" sz="6000" dirty="0" smtClean="0"/>
-              <a:t>.	</a:t>
-            </a:r>
-            <a:endParaRPr lang="en-US" sz="6000" dirty="0" smtClean="0"/>
+              <a:t>In my project, there’s a heart.  Move it to your backpack and then replace the bat.	</a:t>
+            </a:r>
           </a:p>
           <a:p>
             <a:pPr lvl="1"/>
@@ -10922,15 +10753,7 @@
                   <a:srgbClr val="0E9A6C"/>
                 </a:solidFill>
               </a:rPr>
-              <a:t>Pen </a:t>
-            </a:r>
-            <a:r>
-              <a:rPr lang="en-US" dirty="0" smtClean="0">
-                <a:solidFill>
-                  <a:srgbClr val="0E9A6C"/>
-                </a:solidFill>
-              </a:rPr>
-              <a:t>Drawing</a:t>
+              <a:t>Pen Drawing</a:t>
             </a:r>
           </a:p>
           <a:p>
@@ -11796,11 +11619,7 @@
             </a:r>
             <a:r>
               <a:rPr lang="en-US" i="1" dirty="0" smtClean="0"/>
-              <a:t>secret </a:t>
-            </a:r>
-            <a:r>
-              <a:rPr lang="en-US" i="1" dirty="0" smtClean="0"/>
-              <a:t>message</a:t>
+              <a:t>secret message</a:t>
             </a:r>
           </a:p>
           <a:p>
@@ -11819,23 +11638,7 @@
                   <a:srgbClr val="0070C0"/>
                 </a:solidFill>
               </a:rPr>
-              <a:t>Could it make </a:t>
-            </a:r>
-            <a:r>
-              <a:rPr lang="en-US" dirty="0" smtClean="0">
-                <a:solidFill>
-                  <a:srgbClr val="0070C0"/>
-                </a:solidFill>
-              </a:rPr>
-              <a:t>Heart Bounce </a:t>
-            </a:r>
-            <a:r>
-              <a:rPr lang="en-US" dirty="0" smtClean="0">
-                <a:solidFill>
-                  <a:srgbClr val="0070C0"/>
-                </a:solidFill>
-              </a:rPr>
-              <a:t>better?</a:t>
+              <a:t>Could it make Heart Bounce better?</a:t>
             </a:r>
           </a:p>
           <a:p>
@@ -11884,11 +11687,6 @@
               </a:rPr>
               <a:t>Let it tell anything that cares!</a:t>
             </a:r>
-            <a:endParaRPr lang="en-US" sz="2600" dirty="0" smtClean="0">
-              <a:solidFill>
-                <a:srgbClr val="7030A0"/>
-              </a:solidFill>
-            </a:endParaRPr>
           </a:p>
           <a:p>
             <a:pPr marL="0" indent="0" algn="r">
@@ -12886,11 +12684,7 @@
             </a:pPr>
             <a:r>
               <a:rPr lang="en-US" sz="2800" b="1" dirty="0" smtClean="0"/>
-              <a:t>Game Start </a:t>
-            </a:r>
-            <a:r>
-              <a:rPr lang="en-US" sz="2800" b="1" dirty="0" smtClean="0"/>
-              <a:t>screen</a:t>
+              <a:t>Game Start screen</a:t>
             </a:r>
           </a:p>
           <a:p>
@@ -12900,11 +12694,7 @@
             </a:pPr>
             <a:r>
               <a:rPr lang="en-US" dirty="0" smtClean="0"/>
-              <a:t>I </a:t>
-            </a:r>
-            <a:r>
-              <a:rPr lang="en-US" dirty="0" smtClean="0"/>
-              <a:t>was able to make an opening message that disappeared when the game starts, without sending a </a:t>
+              <a:t>I was able to make an opening message that disappeared when the game starts, without sending a </a:t>
             </a:r>
             <a:r>
               <a:rPr lang="en-US" i="1" dirty="0" smtClean="0"/>
@@ -12928,11 +12718,7 @@
             </a:pPr>
             <a:r>
               <a:rPr lang="en-US" sz="2600" b="1" dirty="0" smtClean="0"/>
-              <a:t>Game End </a:t>
-            </a:r>
-            <a:r>
-              <a:rPr lang="en-US" sz="2600" b="1" dirty="0" smtClean="0"/>
-              <a:t>screen</a:t>
+              <a:t>Game End screen</a:t>
             </a:r>
             <a:endParaRPr lang="en-US" dirty="0" smtClean="0"/>
           </a:p>
@@ -12943,15 +12729,7 @@
             </a:pPr>
             <a:r>
               <a:rPr lang="en-US" dirty="0" smtClean="0"/>
-              <a:t>When the heart makes it past the </a:t>
-            </a:r>
-            <a:r>
-              <a:rPr lang="en-US" dirty="0" smtClean="0"/>
-              <a:t>paddle and touches the , </a:t>
-            </a:r>
-            <a:r>
-              <a:rPr lang="en-US" dirty="0" smtClean="0"/>
-              <a:t>the heart should send a message out.  The ‘end of game’ sprite should appear and all others should disappear.</a:t>
+              <a:t>When the heart makes it past the paddle and touches the , the heart should send a message out.  The ‘end of game’ sprite should appear and all others should disappear.</a:t>
             </a:r>
           </a:p>
           <a:p>
@@ -13809,7 +13587,7 @@
   <a:extraClrSchemeLst/>
   <a:extLst>
     <a:ext uri="{05A4C25C-085E-4340-85A3-A5531E510DB2}">
-      <thm15:themeFamily xmlns:thm15="http://schemas.microsoft.com/office/thememl/2012/main" name="Office Theme" id="{62F939B6-93AF-4DB8-9C6B-D6C7DFDC589F}" vid="{4A3C46E8-61CC-4603-A589-7422A47A8E4A}"/>
+      <thm15:themeFamily xmlns:thm15="http://schemas.microsoft.com/office/thememl/2012/main" xmlns="" name="Office Theme" id="{62F939B6-93AF-4DB8-9C6B-D6C7DFDC589F}" vid="{4A3C46E8-61CC-4603-A589-7422A47A8E4A}"/>
     </a:ext>
   </a:extLst>
 </a:theme>
@@ -14070,7 +13848,7 @@
   <a:extraClrSchemeLst/>
   <a:extLst>
     <a:ext uri="{05A4C25C-085E-4340-85A3-A5531E510DB2}">
-      <thm15:themeFamily xmlns:thm15="http://schemas.microsoft.com/office/thememl/2012/main" name="Office Theme" id="{62F939B6-93AF-4DB8-9C6B-D6C7DFDC589F}" vid="{4A3C46E8-61CC-4603-A589-7422A47A8E4A}"/>
+      <thm15:themeFamily xmlns:thm15="http://schemas.microsoft.com/office/thememl/2012/main" xmlns="" name="Office Theme" id="{62F939B6-93AF-4DB8-9C6B-D6C7DFDC589F}" vid="{4A3C46E8-61CC-4603-A589-7422A47A8E4A}"/>
     </a:ext>
   </a:extLst>
 </a:theme>

</xml_diff>